<commit_message>
Corrected spelling mistakes in the PPT
</commit_message>
<xml_diff>
--- a/Documents/ProjectOverview.pptx
+++ b/Documents/ProjectOverview.pptx
@@ -237,7 +237,7 @@
                   <a:schemeClr val="tx2"/>
                 </a:solidFill>
               </a:rPr>
-              <a:t>5/27/2016</a:t>
+              <a:t>5/28/2016</a:t>
             </a:fld>
             <a:endParaRPr>
               <a:solidFill>
@@ -427,7 +427,7 @@
             <a:fld id="{F95CF31C-F757-429C-A789-86504F04C3BE}" type="datetimeFigureOut">
               <a:rPr lang="en-US"/>
               <a:pPr/>
-              <a:t>5/27/2016</a:t>
+              <a:t>5/28/2016</a:t>
             </a:fld>
             <a:endParaRPr/>
           </a:p>
@@ -764,7 +764,7 @@
           </a:lstStyle>
           <a:p>
             <a:r>
-              <a:rPr lang="en-US" smtClean="0"/>
+              <a:rPr lang="en-US"/>
               <a:t>Click to edit Master title style</a:t>
             </a:r>
             <a:endParaRPr/>
@@ -886,7 +886,7 @@
           </a:lstStyle>
           <a:p>
             <a:r>
-              <a:rPr lang="en-US" smtClean="0"/>
+              <a:rPr lang="en-US"/>
               <a:t>Click to edit Master subtitle style</a:t>
             </a:r>
             <a:endParaRPr/>
@@ -915,13 +915,6 @@
       </p:transition>
     </mc:Fallback>
   </mc:AlternateContent>
-  <p:timing>
-    <p:tnLst>
-      <p:par>
-        <p:cTn id="1" dur="indefinite" restart="never" nodeType="tmRoot"/>
-      </p:par>
-    </p:tnLst>
-  </p:timing>
 </p:sldLayout>
 </file>
 
@@ -958,7 +951,7 @@
           <a:lstStyle/>
           <a:p>
             <a:r>
-              <a:rPr lang="en-US" smtClean="0"/>
+              <a:rPr lang="en-US"/>
               <a:t>Click to edit Master title style</a:t>
             </a:r>
             <a:endParaRPr/>
@@ -982,35 +975,35 @@
           <a:p>
             <a:pPr lvl="0"/>
             <a:r>
-              <a:rPr lang="en-US" smtClean="0"/>
+              <a:rPr lang="en-US"/>
               <a:t>Click to edit Master text styles</a:t>
             </a:r>
           </a:p>
           <a:p>
             <a:pPr lvl="1"/>
             <a:r>
-              <a:rPr lang="en-US" smtClean="0"/>
+              <a:rPr lang="en-US"/>
               <a:t>Second level</a:t>
             </a:r>
           </a:p>
           <a:p>
             <a:pPr lvl="2"/>
             <a:r>
-              <a:rPr lang="en-US" smtClean="0"/>
+              <a:rPr lang="en-US"/>
               <a:t>Third level</a:t>
             </a:r>
           </a:p>
           <a:p>
             <a:pPr lvl="3"/>
             <a:r>
-              <a:rPr lang="en-US" smtClean="0"/>
+              <a:rPr lang="en-US"/>
               <a:t>Fourth level</a:t>
             </a:r>
           </a:p>
           <a:p>
             <a:pPr lvl="4"/>
             <a:r>
-              <a:rPr lang="en-US" smtClean="0"/>
+              <a:rPr lang="en-US"/>
               <a:t>Fifth level</a:t>
             </a:r>
             <a:endParaRPr/>
@@ -1034,7 +1027,7 @@
           <a:p>
             <a:fld id="{7AECB6C2-1084-4AED-A74A-DF028B0094EA}" type="datetimeFigureOut">
               <a:rPr lang="en-US"/>
-              <a:t>5/27/2016</a:t>
+              <a:t>5/28/2016</a:t>
             </a:fld>
             <a:endParaRPr/>
           </a:p>
@@ -1104,13 +1097,6 @@
       </p:transition>
     </mc:Fallback>
   </mc:AlternateContent>
-  <p:timing>
-    <p:tnLst>
-      <p:par>
-        <p:cTn id="1" dur="indefinite" restart="never" nodeType="tmRoot"/>
-      </p:par>
-    </p:tnLst>
-  </p:timing>
 </p:sldLayout>
 </file>
 
@@ -1152,7 +1138,7 @@
           <a:lstStyle/>
           <a:p>
             <a:r>
-              <a:rPr lang="en-US" smtClean="0"/>
+              <a:rPr lang="en-US"/>
               <a:t>Click to edit Master title style</a:t>
             </a:r>
             <a:endParaRPr/>
@@ -1181,35 +1167,35 @@
           <a:p>
             <a:pPr lvl="0"/>
             <a:r>
-              <a:rPr lang="en-US" smtClean="0"/>
+              <a:rPr lang="en-US"/>
               <a:t>Click to edit Master text styles</a:t>
             </a:r>
           </a:p>
           <a:p>
             <a:pPr lvl="1"/>
             <a:r>
-              <a:rPr lang="en-US" smtClean="0"/>
+              <a:rPr lang="en-US"/>
               <a:t>Second level</a:t>
             </a:r>
           </a:p>
           <a:p>
             <a:pPr lvl="2"/>
             <a:r>
-              <a:rPr lang="en-US" smtClean="0"/>
+              <a:rPr lang="en-US"/>
               <a:t>Third level</a:t>
             </a:r>
           </a:p>
           <a:p>
             <a:pPr lvl="3"/>
             <a:r>
-              <a:rPr lang="en-US" smtClean="0"/>
+              <a:rPr lang="en-US"/>
               <a:t>Fourth level</a:t>
             </a:r>
           </a:p>
           <a:p>
             <a:pPr lvl="4"/>
             <a:r>
-              <a:rPr lang="en-US" smtClean="0"/>
+              <a:rPr lang="en-US"/>
               <a:t>Fifth level</a:t>
             </a:r>
             <a:endParaRPr/>
@@ -1233,7 +1219,7 @@
           <a:p>
             <a:fld id="{7AECB6C2-1084-4AED-A74A-DF028B0094EA}" type="datetimeFigureOut">
               <a:rPr lang="en-US"/>
-              <a:t>5/27/2016</a:t>
+              <a:t>5/28/2016</a:t>
             </a:fld>
             <a:endParaRPr/>
           </a:p>
@@ -1303,13 +1289,6 @@
       </p:transition>
     </mc:Fallback>
   </mc:AlternateContent>
-  <p:timing>
-    <p:tnLst>
-      <p:par>
-        <p:cTn id="1" dur="indefinite" restart="never" nodeType="tmRoot"/>
-      </p:par>
-    </p:tnLst>
-  </p:timing>
 </p:sldLayout>
 </file>
 
@@ -1346,7 +1325,7 @@
           <a:lstStyle/>
           <a:p>
             <a:r>
-              <a:rPr lang="en-US" smtClean="0"/>
+              <a:rPr lang="en-US"/>
               <a:t>Click to edit Master title style</a:t>
             </a:r>
             <a:endParaRPr/>
@@ -1386,35 +1365,35 @@
           <a:p>
             <a:pPr lvl="0"/>
             <a:r>
-              <a:rPr lang="en-US" smtClean="0"/>
+              <a:rPr lang="en-US"/>
               <a:t>Click to edit Master text styles</a:t>
             </a:r>
           </a:p>
           <a:p>
             <a:pPr lvl="1"/>
             <a:r>
-              <a:rPr lang="en-US" smtClean="0"/>
+              <a:rPr lang="en-US"/>
               <a:t>Second level</a:t>
             </a:r>
           </a:p>
           <a:p>
             <a:pPr lvl="2"/>
             <a:r>
-              <a:rPr lang="en-US" smtClean="0"/>
+              <a:rPr lang="en-US"/>
               <a:t>Third level</a:t>
             </a:r>
           </a:p>
           <a:p>
             <a:pPr lvl="3"/>
             <a:r>
-              <a:rPr lang="en-US" smtClean="0"/>
+              <a:rPr lang="en-US"/>
               <a:t>Fourth level</a:t>
             </a:r>
           </a:p>
           <a:p>
             <a:pPr lvl="4"/>
             <a:r>
-              <a:rPr lang="en-US" smtClean="0"/>
+              <a:rPr lang="en-US"/>
               <a:t>Fifth level</a:t>
             </a:r>
             <a:endParaRPr/>
@@ -1438,7 +1417,7 @@
           <a:p>
             <a:fld id="{8B5A30F4-0B4E-4E4B-BC36-C30CD13F4E17}" type="datetimeFigureOut">
               <a:rPr lang="en-US"/>
-              <a:t>5/27/2016</a:t>
+              <a:t>5/28/2016</a:t>
             </a:fld>
             <a:endParaRPr/>
           </a:p>
@@ -1508,13 +1487,6 @@
       </p:transition>
     </mc:Fallback>
   </mc:AlternateContent>
-  <p:timing>
-    <p:tnLst>
-      <p:par>
-        <p:cTn id="1" dur="indefinite" restart="never" nodeType="tmRoot"/>
-      </p:par>
-    </p:tnLst>
-  </p:timing>
 </p:sldLayout>
 </file>
 
@@ -1576,7 +1548,7 @@
           </a:lstStyle>
           <a:p>
             <a:r>
-              <a:rPr lang="en-US" smtClean="0"/>
+              <a:rPr lang="en-US"/>
               <a:t>Click to edit Master title style</a:t>
             </a:r>
             <a:endParaRPr/>
@@ -1699,7 +1671,7 @@
           <a:p>
             <a:pPr lvl="0"/>
             <a:r>
-              <a:rPr lang="en-US" smtClean="0"/>
+              <a:rPr lang="en-US"/>
               <a:t>Click to edit Master text styles</a:t>
             </a:r>
           </a:p>
@@ -1727,13 +1699,6 @@
       </p:transition>
     </mc:Fallback>
   </mc:AlternateContent>
-  <p:timing>
-    <p:tnLst>
-      <p:par>
-        <p:cTn id="1" dur="indefinite" restart="never" nodeType="tmRoot"/>
-      </p:par>
-    </p:tnLst>
-  </p:timing>
 </p:sldLayout>
 </file>
 
@@ -1770,7 +1735,7 @@
           <a:lstStyle/>
           <a:p>
             <a:r>
-              <a:rPr lang="en-US" smtClean="0"/>
+              <a:rPr lang="en-US"/>
               <a:t>Click to edit Master title style</a:t>
             </a:r>
             <a:endParaRPr/>
@@ -1829,35 +1794,35 @@
           <a:p>
             <a:pPr lvl="0"/>
             <a:r>
-              <a:rPr lang="en-US" smtClean="0"/>
+              <a:rPr lang="en-US"/>
               <a:t>Click to edit Master text styles</a:t>
             </a:r>
           </a:p>
           <a:p>
             <a:pPr lvl="1"/>
             <a:r>
-              <a:rPr lang="en-US" smtClean="0"/>
+              <a:rPr lang="en-US"/>
               <a:t>Second level</a:t>
             </a:r>
           </a:p>
           <a:p>
             <a:pPr lvl="2"/>
             <a:r>
-              <a:rPr lang="en-US" smtClean="0"/>
+              <a:rPr lang="en-US"/>
               <a:t>Third level</a:t>
             </a:r>
           </a:p>
           <a:p>
             <a:pPr lvl="3"/>
             <a:r>
-              <a:rPr lang="en-US" smtClean="0"/>
+              <a:rPr lang="en-US"/>
               <a:t>Fourth level</a:t>
             </a:r>
           </a:p>
           <a:p>
             <a:pPr lvl="4"/>
             <a:r>
-              <a:rPr lang="en-US" smtClean="0"/>
+              <a:rPr lang="en-US"/>
               <a:t>Fifth level</a:t>
             </a:r>
             <a:endParaRPr/>
@@ -1916,35 +1881,35 @@
           <a:p>
             <a:pPr lvl="0"/>
             <a:r>
-              <a:rPr lang="en-US" smtClean="0"/>
+              <a:rPr lang="en-US"/>
               <a:t>Click to edit Master text styles</a:t>
             </a:r>
           </a:p>
           <a:p>
             <a:pPr lvl="1"/>
             <a:r>
-              <a:rPr lang="en-US" smtClean="0"/>
+              <a:rPr lang="en-US"/>
               <a:t>Second level</a:t>
             </a:r>
           </a:p>
           <a:p>
             <a:pPr lvl="2"/>
             <a:r>
-              <a:rPr lang="en-US" smtClean="0"/>
+              <a:rPr lang="en-US"/>
               <a:t>Third level</a:t>
             </a:r>
           </a:p>
           <a:p>
             <a:pPr lvl="3"/>
             <a:r>
-              <a:rPr lang="en-US" smtClean="0"/>
+              <a:rPr lang="en-US"/>
               <a:t>Fourth level</a:t>
             </a:r>
           </a:p>
           <a:p>
             <a:pPr lvl="4"/>
             <a:r>
-              <a:rPr lang="en-US" smtClean="0"/>
+              <a:rPr lang="en-US"/>
               <a:t>Fifth level</a:t>
             </a:r>
             <a:endParaRPr/>
@@ -1968,7 +1933,7 @@
           <a:p>
             <a:fld id="{2DD204D1-F9BD-4643-8480-6EA41EB484F1}" type="datetimeFigureOut">
               <a:rPr lang="en-US"/>
-              <a:t>5/27/2016</a:t>
+              <a:t>5/28/2016</a:t>
             </a:fld>
             <a:endParaRPr/>
           </a:p>
@@ -2038,13 +2003,6 @@
       </p:transition>
     </mc:Fallback>
   </mc:AlternateContent>
-  <p:timing>
-    <p:tnLst>
-      <p:par>
-        <p:cTn id="1" dur="indefinite" restart="never" nodeType="tmRoot"/>
-      </p:par>
-    </p:tnLst>
-  </p:timing>
 </p:sldLayout>
 </file>
 
@@ -2085,7 +2043,7 @@
           </a:lstStyle>
           <a:p>
             <a:r>
-              <a:rPr lang="en-US" smtClean="0"/>
+              <a:rPr lang="en-US"/>
               <a:t>Click to edit Master title style</a:t>
             </a:r>
             <a:endParaRPr/>
@@ -2156,7 +2114,7 @@
           <a:p>
             <a:pPr lvl="0"/>
             <a:r>
-              <a:rPr lang="en-US" smtClean="0"/>
+              <a:rPr lang="en-US"/>
               <a:t>Click to edit Master text styles</a:t>
             </a:r>
           </a:p>
@@ -2214,35 +2172,35 @@
           <a:p>
             <a:pPr lvl="0"/>
             <a:r>
-              <a:rPr lang="en-US" smtClean="0"/>
+              <a:rPr lang="en-US"/>
               <a:t>Click to edit Master text styles</a:t>
             </a:r>
           </a:p>
           <a:p>
             <a:pPr lvl="1"/>
             <a:r>
-              <a:rPr lang="en-US" smtClean="0"/>
+              <a:rPr lang="en-US"/>
               <a:t>Second level</a:t>
             </a:r>
           </a:p>
           <a:p>
             <a:pPr lvl="2"/>
             <a:r>
-              <a:rPr lang="en-US" smtClean="0"/>
+              <a:rPr lang="en-US"/>
               <a:t>Third level</a:t>
             </a:r>
           </a:p>
           <a:p>
             <a:pPr lvl="3"/>
             <a:r>
-              <a:rPr lang="en-US" smtClean="0"/>
+              <a:rPr lang="en-US"/>
               <a:t>Fourth level</a:t>
             </a:r>
           </a:p>
           <a:p>
             <a:pPr lvl="4"/>
             <a:r>
-              <a:rPr lang="en-US" smtClean="0"/>
+              <a:rPr lang="en-US"/>
               <a:t>Fifth level</a:t>
             </a:r>
             <a:endParaRPr/>
@@ -2313,7 +2271,7 @@
           <a:p>
             <a:pPr lvl="0"/>
             <a:r>
-              <a:rPr lang="en-US" smtClean="0"/>
+              <a:rPr lang="en-US"/>
               <a:t>Click to edit Master text styles</a:t>
             </a:r>
           </a:p>
@@ -2371,35 +2329,35 @@
           <a:p>
             <a:pPr lvl="0"/>
             <a:r>
-              <a:rPr lang="en-US" smtClean="0"/>
+              <a:rPr lang="en-US"/>
               <a:t>Click to edit Master text styles</a:t>
             </a:r>
           </a:p>
           <a:p>
             <a:pPr lvl="1"/>
             <a:r>
-              <a:rPr lang="en-US" smtClean="0"/>
+              <a:rPr lang="en-US"/>
               <a:t>Second level</a:t>
             </a:r>
           </a:p>
           <a:p>
             <a:pPr lvl="2"/>
             <a:r>
-              <a:rPr lang="en-US" smtClean="0"/>
+              <a:rPr lang="en-US"/>
               <a:t>Third level</a:t>
             </a:r>
           </a:p>
           <a:p>
             <a:pPr lvl="3"/>
             <a:r>
-              <a:rPr lang="en-US" smtClean="0"/>
+              <a:rPr lang="en-US"/>
               <a:t>Fourth level</a:t>
             </a:r>
           </a:p>
           <a:p>
             <a:pPr lvl="4"/>
             <a:r>
-              <a:rPr lang="en-US" smtClean="0"/>
+              <a:rPr lang="en-US"/>
               <a:t>Fifth level</a:t>
             </a:r>
             <a:endParaRPr/>
@@ -2423,7 +2381,7 @@
           <a:p>
             <a:fld id="{2DD204D1-F9BD-4643-8480-6EA41EB484F1}" type="datetimeFigureOut">
               <a:rPr lang="en-US"/>
-              <a:t>5/27/2016</a:t>
+              <a:t>5/28/2016</a:t>
             </a:fld>
             <a:endParaRPr/>
           </a:p>
@@ -2493,13 +2451,6 @@
       </p:transition>
     </mc:Fallback>
   </mc:AlternateContent>
-  <p:timing>
-    <p:tnLst>
-      <p:par>
-        <p:cTn id="1" dur="indefinite" restart="never" nodeType="tmRoot"/>
-      </p:par>
-    </p:tnLst>
-  </p:timing>
 </p:sldLayout>
 </file>
 
@@ -2536,7 +2487,7 @@
           <a:lstStyle/>
           <a:p>
             <a:r>
-              <a:rPr lang="en-US" smtClean="0"/>
+              <a:rPr lang="en-US"/>
               <a:t>Click to edit Master title style</a:t>
             </a:r>
             <a:endParaRPr/>
@@ -2560,7 +2511,7 @@
           <a:p>
             <a:fld id="{2DD204D1-F9BD-4643-8480-6EA41EB484F1}" type="datetimeFigureOut">
               <a:rPr lang="en-US"/>
-              <a:t>5/27/2016</a:t>
+              <a:t>5/28/2016</a:t>
             </a:fld>
             <a:endParaRPr/>
           </a:p>
@@ -2630,13 +2581,6 @@
       </p:transition>
     </mc:Fallback>
   </mc:AlternateContent>
-  <p:timing>
-    <p:tnLst>
-      <p:par>
-        <p:cTn id="1" dur="indefinite" restart="never" nodeType="tmRoot"/>
-      </p:par>
-    </p:tnLst>
-  </p:timing>
 </p:sldLayout>
 </file>
 
@@ -2674,7 +2618,7 @@
           <a:p>
             <a:fld id="{2DD204D1-F9BD-4643-8480-6EA41EB484F1}" type="datetimeFigureOut">
               <a:rPr lang="en-US"/>
-              <a:t>5/27/2016</a:t>
+              <a:t>5/28/2016</a:t>
             </a:fld>
             <a:endParaRPr/>
           </a:p>
@@ -2744,13 +2688,6 @@
       </p:transition>
     </mc:Fallback>
   </mc:AlternateContent>
-  <p:timing>
-    <p:tnLst>
-      <p:par>
-        <p:cTn id="1" dur="indefinite" restart="never" nodeType="tmRoot"/>
-      </p:par>
-    </p:tnLst>
-  </p:timing>
 </p:sldLayout>
 </file>
 
@@ -2857,7 +2794,7 @@
           </a:lstStyle>
           <a:p>
             <a:r>
-              <a:rPr lang="en-US" smtClean="0"/>
+              <a:rPr lang="en-US"/>
               <a:t>Click to edit Master title style</a:t>
             </a:r>
             <a:endParaRPr/>
@@ -2916,35 +2853,35 @@
           <a:p>
             <a:pPr lvl="0"/>
             <a:r>
-              <a:rPr lang="en-US" smtClean="0"/>
+              <a:rPr lang="en-US"/>
               <a:t>Click to edit Master text styles</a:t>
             </a:r>
           </a:p>
           <a:p>
             <a:pPr lvl="1"/>
             <a:r>
-              <a:rPr lang="en-US" smtClean="0"/>
+              <a:rPr lang="en-US"/>
               <a:t>Second level</a:t>
             </a:r>
           </a:p>
           <a:p>
             <a:pPr lvl="2"/>
             <a:r>
-              <a:rPr lang="en-US" smtClean="0"/>
+              <a:rPr lang="en-US"/>
               <a:t>Third level</a:t>
             </a:r>
           </a:p>
           <a:p>
             <a:pPr lvl="3"/>
             <a:r>
-              <a:rPr lang="en-US" smtClean="0"/>
+              <a:rPr lang="en-US"/>
               <a:t>Fourth level</a:t>
             </a:r>
           </a:p>
           <a:p>
             <a:pPr lvl="4"/>
             <a:r>
-              <a:rPr lang="en-US" smtClean="0"/>
+              <a:rPr lang="en-US"/>
               <a:t>Fifth level</a:t>
             </a:r>
             <a:endParaRPr/>
@@ -3015,7 +2952,7 @@
           <a:p>
             <a:pPr lvl="0"/>
             <a:r>
-              <a:rPr lang="en-US" smtClean="0"/>
+              <a:rPr lang="en-US"/>
               <a:t>Click to edit Master text styles</a:t>
             </a:r>
           </a:p>
@@ -3038,7 +2975,7 @@
           <a:p>
             <a:fld id="{126BF754-515F-40B9-8D24-D54D5825B3D0}" type="datetimeFigureOut">
               <a:rPr lang="en-US"/>
-              <a:t>5/27/2016</a:t>
+              <a:t>5/28/2016</a:t>
             </a:fld>
             <a:endParaRPr/>
           </a:p>
@@ -3108,13 +3045,6 @@
       </p:transition>
     </mc:Fallback>
   </mc:AlternateContent>
-  <p:timing>
-    <p:tnLst>
-      <p:par>
-        <p:cTn id="1" dur="indefinite" restart="never" nodeType="tmRoot"/>
-      </p:par>
-    </p:tnLst>
-  </p:timing>
 </p:sldLayout>
 </file>
 
@@ -3221,7 +3151,7 @@
           </a:lstStyle>
           <a:p>
             <a:r>
-              <a:rPr lang="en-US" smtClean="0"/>
+              <a:rPr lang="en-US"/>
               <a:t>Click to edit Master title style</a:t>
             </a:r>
             <a:endParaRPr/>
@@ -3288,7 +3218,7 @@
           </a:lstStyle>
           <a:p>
             <a:r>
-              <a:rPr lang="en-US" smtClean="0"/>
+              <a:rPr lang="en-US"/>
               <a:t>Click icon to add picture</a:t>
             </a:r>
             <a:endParaRPr/>
@@ -3359,7 +3289,7 @@
           <a:p>
             <a:pPr lvl="0"/>
             <a:r>
-              <a:rPr lang="en-US" smtClean="0"/>
+              <a:rPr lang="en-US"/>
               <a:t>Click to edit Master text styles</a:t>
             </a:r>
           </a:p>
@@ -3382,7 +3312,7 @@
           <a:p>
             <a:fld id="{126BF754-515F-40B9-8D24-D54D5825B3D0}" type="datetimeFigureOut">
               <a:rPr lang="en-US"/>
-              <a:t>5/27/2016</a:t>
+              <a:t>5/28/2016</a:t>
             </a:fld>
             <a:endParaRPr/>
           </a:p>
@@ -3452,13 +3382,6 @@
       </p:transition>
     </mc:Fallback>
   </mc:AlternateContent>
-  <p:timing>
-    <p:tnLst>
-      <p:par>
-        <p:cTn id="1" dur="indefinite" restart="never" nodeType="tmRoot"/>
-      </p:par>
-    </p:tnLst>
-  </p:timing>
 </p:sldLayout>
 </file>
 
@@ -3578,7 +3501,7 @@
           <a:lstStyle/>
           <a:p>
             <a:r>
-              <a:rPr lang="en-US" smtClean="0"/>
+              <a:rPr lang="en-US"/>
               <a:t>Click to edit Master title style</a:t>
             </a:r>
             <a:endParaRPr dirty="0"/>
@@ -3612,35 +3535,35 @@
           <a:p>
             <a:pPr lvl="0"/>
             <a:r>
-              <a:rPr lang="en-US" smtClean="0"/>
+              <a:rPr lang="en-US"/>
               <a:t>Click to edit Master text styles</a:t>
             </a:r>
           </a:p>
           <a:p>
             <a:pPr lvl="1"/>
             <a:r>
-              <a:rPr lang="en-US" smtClean="0"/>
+              <a:rPr lang="en-US"/>
               <a:t>Second level</a:t>
             </a:r>
           </a:p>
           <a:p>
             <a:pPr lvl="2"/>
             <a:r>
-              <a:rPr lang="en-US" smtClean="0"/>
+              <a:rPr lang="en-US"/>
               <a:t>Third level</a:t>
             </a:r>
           </a:p>
           <a:p>
             <a:pPr lvl="3"/>
             <a:r>
-              <a:rPr lang="en-US" smtClean="0"/>
+              <a:rPr lang="en-US"/>
               <a:t>Fourth level</a:t>
             </a:r>
           </a:p>
           <a:p>
             <a:pPr lvl="4"/>
             <a:r>
-              <a:rPr lang="en-US" smtClean="0"/>
+              <a:rPr lang="en-US"/>
               <a:t>Fifth level</a:t>
             </a:r>
             <a:endParaRPr dirty="0"/>
@@ -3684,7 +3607,7 @@
             <a:fld id="{2DD204D1-F9BD-4643-8480-6EA41EB484F1}" type="datetimeFigureOut">
               <a:rPr lang="en-US"/>
               <a:pPr/>
-              <a:t>5/27/2016</a:t>
+              <a:t>5/28/2016</a:t>
             </a:fld>
             <a:endParaRPr/>
           </a:p>
@@ -3804,13 +3727,6 @@
       </p:transition>
     </mc:Fallback>
   </mc:AlternateContent>
-  <p:timing>
-    <p:tnLst>
-      <p:par>
-        <p:cTn id="1" dur="indefinite" restart="never" nodeType="tmRoot"/>
-      </p:par>
-    </p:tnLst>
-  </p:timing>
   <p:txStyles>
     <p:titleStyle>
       <a:lvl1pPr algn="l" defTabSz="1218987" rtl="0" eaLnBrk="1" latinLnBrk="0" hangingPunct="1">
@@ -4158,18 +4074,17 @@
           <a:lstStyle/>
           <a:p>
             <a:r>
-              <a:rPr lang="en-US" dirty="0" smtClean="0"/>
+              <a:rPr lang="en-US" dirty="0"/>
               <a:t>Redesign “</a:t>
             </a:r>
             <a:r>
-              <a:rPr lang="en-US" dirty="0" err="1" smtClean="0"/>
+              <a:rPr lang="en-US" dirty="0" err="1"/>
               <a:t>myNEU</a:t>
             </a:r>
             <a:r>
-              <a:rPr lang="en-US" dirty="0" smtClean="0"/>
+              <a:rPr lang="en-US" dirty="0"/>
               <a:t>” and its feature portlets.</a:t>
             </a:r>
-            <a:endParaRPr lang="en-US" dirty="0"/>
           </a:p>
         </p:txBody>
       </p:sp>
@@ -4201,7 +4116,7 @@
               </a:lnSpc>
             </a:pPr>
             <a:r>
-              <a:rPr lang="en-US" sz="2000" dirty="0" smtClean="0"/>
+              <a:rPr lang="en-US" sz="2000" dirty="0"/>
               <a:t>A project overview presented by:</a:t>
             </a:r>
           </a:p>
@@ -4213,18 +4128,18 @@
               <a:buAutoNum type="arabicParenR"/>
             </a:pPr>
             <a:r>
-              <a:rPr lang="en-US" sz="2000" dirty="0" err="1" smtClean="0"/>
+              <a:rPr lang="en-US" sz="2000" dirty="0" err="1"/>
               <a:t>Vineet</a:t>
             </a:r>
             <a:r>
-              <a:rPr lang="en-US" sz="2000" dirty="0" smtClean="0"/>
+              <a:rPr lang="en-US" sz="2000" dirty="0"/>
               <a:t> </a:t>
             </a:r>
             <a:r>
-              <a:rPr lang="en-US" sz="2000" dirty="0" err="1" smtClean="0"/>
+              <a:rPr lang="en-US" sz="2000" dirty="0" err="1"/>
               <a:t>Dandekar</a:t>
             </a:r>
-            <a:endParaRPr lang="en-US" sz="2000" dirty="0" smtClean="0"/>
+            <a:endParaRPr lang="en-US" sz="2000" dirty="0"/>
           </a:p>
           <a:p>
             <a:pPr marL="514350" indent="-514350">
@@ -4234,10 +4149,9 @@
               <a:buAutoNum type="arabicParenR"/>
             </a:pPr>
             <a:r>
-              <a:rPr lang="en-US" sz="2000" dirty="0" smtClean="0"/>
+              <a:rPr lang="en-US" sz="2000" dirty="0"/>
               <a:t>Rugved Jahagirdar</a:t>
             </a:r>
-            <a:endParaRPr lang="en-US" sz="2000" dirty="0"/>
           </a:p>
         </p:txBody>
       </p:sp>
@@ -4365,13 +4279,6 @@
       </p:transition>
     </mc:Fallback>
   </mc:AlternateContent>
-  <p:timing>
-    <p:tnLst>
-      <p:par>
-        <p:cTn id="1" dur="indefinite" restart="never" nodeType="tmRoot"/>
-      </p:par>
-    </p:tnLst>
-  </p:timing>
 </p:sld>
 </file>
 
@@ -4415,10 +4322,9 @@
           <a:lstStyle/>
           <a:p>
             <a:r>
-              <a:rPr lang="en-US" dirty="0" smtClean="0"/>
+              <a:rPr lang="en-US" dirty="0"/>
               <a:t>Project Scope (What are we doing ?)</a:t>
             </a:r>
-            <a:endParaRPr lang="en-US" dirty="0"/>
           </a:p>
         </p:txBody>
       </p:sp>
@@ -4445,52 +4351,45 @@
           <a:lstStyle/>
           <a:p>
             <a:r>
-              <a:rPr lang="en-US" dirty="0" smtClean="0"/>
+              <a:rPr lang="en-US" dirty="0"/>
               <a:t>Redesign the user experience of </a:t>
             </a:r>
             <a:r>
-              <a:rPr lang="en-US" dirty="0" err="1" smtClean="0"/>
+              <a:rPr lang="en-US" dirty="0" err="1"/>
               <a:t>myNEU</a:t>
             </a:r>
             <a:r>
-              <a:rPr lang="en-US" dirty="0" smtClean="0"/>
+              <a:rPr lang="en-US" dirty="0"/>
               <a:t> portal and many of its features viz. </a:t>
             </a:r>
             <a:r>
+              <a:rPr lang="en-US"/>
+              <a:t>Fees </a:t>
+            </a:r>
+            <a:r>
               <a:rPr lang="en-US" dirty="0"/>
-              <a:t>Fess Payment, Student Employment, Blackboard, </a:t>
-            </a:r>
-            <a:r>
-              <a:rPr lang="en-US" dirty="0" smtClean="0"/>
-              <a:t>etc.</a:t>
-            </a:r>
-            <a:r>
-              <a:rPr lang="en-US" dirty="0" smtClean="0"/>
-              <a:t> </a:t>
-            </a:r>
-            <a:endParaRPr lang="en-US" dirty="0" smtClean="0"/>
-          </a:p>
-          <a:p>
-            <a:r>
-              <a:rPr lang="en-US" dirty="0" smtClean="0"/>
+              <a:t>Payment, Student Employment, Blackboard, etc. </a:t>
+            </a:r>
+          </a:p>
+          <a:p>
+            <a:r>
+              <a:rPr lang="en-US" dirty="0"/>
               <a:t>Fix existing issues, add/drop redundant features.</a:t>
             </a:r>
-            <a:endParaRPr lang="en-US" dirty="0" smtClean="0"/>
-          </a:p>
-          <a:p>
-            <a:r>
-              <a:rPr lang="en-US" dirty="0" smtClean="0"/>
+          </a:p>
+          <a:p>
+            <a:r>
+              <a:rPr lang="en-US" dirty="0"/>
               <a:t>Also, create a mobile app with all </a:t>
             </a:r>
             <a:r>
-              <a:rPr lang="en-US" dirty="0" err="1" smtClean="0"/>
+              <a:rPr lang="en-US" dirty="0" err="1"/>
               <a:t>myNEU</a:t>
             </a:r>
             <a:r>
-              <a:rPr lang="en-US" dirty="0" smtClean="0"/>
+              <a:rPr lang="en-US" dirty="0"/>
               <a:t> features ! </a:t>
             </a:r>
-            <a:endParaRPr lang="en-US" dirty="0"/>
           </a:p>
         </p:txBody>
       </p:sp>
@@ -4537,10 +4436,9 @@
           </a:lstStyle>
           <a:p>
             <a:r>
-              <a:rPr lang="en-US" dirty="0" smtClean="0"/>
+              <a:rPr lang="en-US" dirty="0"/>
               <a:t>Why are we doing this project ?</a:t>
             </a:r>
-            <a:endParaRPr lang="en-US" dirty="0"/>
           </a:p>
         </p:txBody>
       </p:sp>
@@ -4740,22 +4638,21 @@
           </a:lstStyle>
           <a:p>
             <a:r>
-              <a:rPr lang="en-US" dirty="0" smtClean="0"/>
+              <a:rPr lang="en-US" dirty="0"/>
               <a:t>To create a better UX for us ! </a:t>
             </a:r>
           </a:p>
           <a:p>
             <a:r>
-              <a:rPr lang="en-US" dirty="0" smtClean="0"/>
+              <a:rPr lang="en-US" dirty="0"/>
               <a:t>To make website maintenance – an easy, cost efficient task. </a:t>
             </a:r>
           </a:p>
           <a:p>
             <a:r>
-              <a:rPr lang="en-US" dirty="0" smtClean="0"/>
+              <a:rPr lang="en-US" dirty="0"/>
               <a:t>To understand and implement best practices of UX engineering. </a:t>
             </a:r>
-            <a:endParaRPr lang="en-US" dirty="0"/>
           </a:p>
         </p:txBody>
       </p:sp>
@@ -4781,13 +4678,6 @@
       </p:transition>
     </mc:Fallback>
   </mc:AlternateContent>
-  <p:timing>
-    <p:tnLst>
-      <p:par>
-        <p:cTn id="1" dur="indefinite" restart="never" nodeType="tmRoot"/>
-      </p:par>
-    </p:tnLst>
-  </p:timing>
 </p:sld>
 </file>
 
@@ -4824,10 +4714,9 @@
           <a:lstStyle/>
           <a:p>
             <a:r>
-              <a:rPr lang="en-US" dirty="0" smtClean="0"/>
+              <a:rPr lang="en-US" dirty="0"/>
               <a:t>Project Goals – High Level Summary</a:t>
             </a:r>
-            <a:endParaRPr lang="en-US" dirty="0"/>
           </a:p>
         </p:txBody>
       </p:sp>
@@ -4999,7 +4888,7 @@
                 </a:spcAft>
               </a:pPr>
               <a:r>
-                <a:rPr lang="en-US" sz="2300" dirty="0" smtClean="0">
+                <a:rPr lang="en-US" sz="2300" dirty="0">
                   <a:effectLst>
                     <a:outerShdw blurRad="50800" dist="50800" dir="2700000" algn="tl" rotWithShape="0">
                       <a:srgbClr val="000000">
@@ -5187,7 +5076,7 @@
                 </a:spcAft>
               </a:pPr>
               <a:r>
-                <a:rPr lang="en-US" sz="2300" kern="1200" dirty="0" smtClean="0">
+                <a:rPr lang="en-US" sz="2300" kern="1200" dirty="0">
                   <a:effectLst>
                     <a:outerShdw blurRad="50800" dist="50800" dir="2700000" algn="tl" rotWithShape="0">
                       <a:srgbClr val="000000">
@@ -5198,15 +5087,6 @@
                 </a:rPr>
                 <a:t>Prototyping, Information Architecture, UAT</a:t>
               </a:r>
-              <a:endParaRPr lang="en-US" sz="2300" kern="1200" dirty="0">
-                <a:effectLst>
-                  <a:outerShdw blurRad="50800" dist="50800" dir="2700000" algn="tl" rotWithShape="0">
-                    <a:srgbClr val="000000">
-                      <a:alpha val="43137"/>
-                    </a:srgbClr>
-                  </a:outerShdw>
-                </a:effectLst>
-              </a:endParaRPr>
             </a:p>
           </p:txBody>
         </p:sp>
@@ -5375,7 +5255,7 @@
                 </a:spcAft>
               </a:pPr>
               <a:r>
-                <a:rPr lang="en-US" sz="2300" kern="1200" dirty="0" smtClean="0">
+                <a:rPr lang="en-US" sz="2300" kern="1200" dirty="0">
                   <a:effectLst>
                     <a:outerShdw blurRad="50800" dist="50800" dir="2700000" algn="tl" rotWithShape="0">
                       <a:srgbClr val="000000">
@@ -5386,15 +5266,6 @@
                 </a:rPr>
                 <a:t>Final Product, Better UX, Optimization </a:t>
               </a:r>
-              <a:endParaRPr lang="en-US" sz="2300" kern="1200" dirty="0">
-                <a:effectLst>
-                  <a:outerShdw blurRad="50800" dist="50800" dir="2700000" algn="tl" rotWithShape="0">
-                    <a:srgbClr val="000000">
-                      <a:alpha val="43137"/>
-                    </a:srgbClr>
-                  </a:outerShdw>
-                </a:effectLst>
-              </a:endParaRPr>
             </a:p>
           </p:txBody>
         </p:sp>
@@ -5466,13 +5337,6 @@
       </p:transition>
     </mc:Fallback>
   </mc:AlternateContent>
-  <p:timing>
-    <p:tnLst>
-      <p:par>
-        <p:cTn id="1" dur="indefinite" restart="never" nodeType="tmRoot"/>
-      </p:par>
-    </p:tnLst>
-  </p:timing>
 </p:sld>
 </file>
 
@@ -5514,10 +5378,9 @@
           <a:lstStyle/>
           <a:p>
             <a:r>
-              <a:rPr lang="en-US" dirty="0" smtClean="0"/>
+              <a:rPr lang="en-US" dirty="0"/>
               <a:t>Work distribution and schedule</a:t>
             </a:r>
-            <a:endParaRPr lang="en-US" dirty="0"/>
           </a:p>
         </p:txBody>
       </p:sp>
@@ -5544,24 +5407,21 @@
           <a:lstStyle/>
           <a:p>
             <a:r>
-              <a:rPr lang="en-US" dirty="0" smtClean="0"/>
+              <a:rPr lang="en-US" dirty="0"/>
               <a:t>Equal contribution in all stages of project lifecycle, No separate roles </a:t>
             </a:r>
-            <a:endParaRPr lang="en-US" dirty="0" smtClean="0"/>
-          </a:p>
-          <a:p>
-            <a:r>
-              <a:rPr lang="en-US" dirty="0" smtClean="0"/>
+          </a:p>
+          <a:p>
+            <a:r>
+              <a:rPr lang="en-US" dirty="0"/>
               <a:t>Scheduled kick off date – 06/01/15</a:t>
             </a:r>
-            <a:endParaRPr lang="en-US" dirty="0"/>
-          </a:p>
-          <a:p>
-            <a:r>
-              <a:rPr lang="en-US" dirty="0" smtClean="0"/>
+          </a:p>
+          <a:p>
+            <a:r>
+              <a:rPr lang="en-US" dirty="0"/>
               <a:t>Project duration ~ 10 days</a:t>
             </a:r>
-            <a:endParaRPr lang="en-US" dirty="0"/>
           </a:p>
         </p:txBody>
       </p:sp>
@@ -5591,13 +5451,55 @@
                 <a:tableStyleId>{69012ECD-51FC-41F1-AA8D-1B2483CD663E}</a:tableStyleId>
               </a:tblPr>
               <a:tblGrid>
-                <a:gridCol w="1481622"/>
-                <a:gridCol w="1888455"/>
-                <a:gridCol w="1319345"/>
-                <a:gridCol w="1726178"/>
-                <a:gridCol w="1237065"/>
-                <a:gridCol w="1481622"/>
-                <a:gridCol w="1481622"/>
+                <a:gridCol w="1481622">
+                  <a:extLst>
+                    <a:ext uri="{9D8B030D-6E8A-4147-A177-3AD203B41FA5}">
+                      <a16:colId xmlns:a16="http://schemas.microsoft.com/office/drawing/2014/main" val="20000"/>
+                    </a:ext>
+                  </a:extLst>
+                </a:gridCol>
+                <a:gridCol w="1888455">
+                  <a:extLst>
+                    <a:ext uri="{9D8B030D-6E8A-4147-A177-3AD203B41FA5}">
+                      <a16:colId xmlns:a16="http://schemas.microsoft.com/office/drawing/2014/main" val="20001"/>
+                    </a:ext>
+                  </a:extLst>
+                </a:gridCol>
+                <a:gridCol w="1319345">
+                  <a:extLst>
+                    <a:ext uri="{9D8B030D-6E8A-4147-A177-3AD203B41FA5}">
+                      <a16:colId xmlns:a16="http://schemas.microsoft.com/office/drawing/2014/main" val="20002"/>
+                    </a:ext>
+                  </a:extLst>
+                </a:gridCol>
+                <a:gridCol w="1726178">
+                  <a:extLst>
+                    <a:ext uri="{9D8B030D-6E8A-4147-A177-3AD203B41FA5}">
+                      <a16:colId xmlns:a16="http://schemas.microsoft.com/office/drawing/2014/main" val="20003"/>
+                    </a:ext>
+                  </a:extLst>
+                </a:gridCol>
+                <a:gridCol w="1237065">
+                  <a:extLst>
+                    <a:ext uri="{9D8B030D-6E8A-4147-A177-3AD203B41FA5}">
+                      <a16:colId xmlns:a16="http://schemas.microsoft.com/office/drawing/2014/main" val="20004"/>
+                    </a:ext>
+                  </a:extLst>
+                </a:gridCol>
+                <a:gridCol w="1481622">
+                  <a:extLst>
+                    <a:ext uri="{9D8B030D-6E8A-4147-A177-3AD203B41FA5}">
+                      <a16:colId xmlns:a16="http://schemas.microsoft.com/office/drawing/2014/main" val="20005"/>
+                    </a:ext>
+                  </a:extLst>
+                </a:gridCol>
+                <a:gridCol w="1481622">
+                  <a:extLst>
+                    <a:ext uri="{9D8B030D-6E8A-4147-A177-3AD203B41FA5}">
+                      <a16:colId xmlns:a16="http://schemas.microsoft.com/office/drawing/2014/main" val="20006"/>
+                    </a:ext>
+                  </a:extLst>
+                </a:gridCol>
               </a:tblGrid>
               <a:tr h="1110663">
                 <a:tc rowSpan="2">
@@ -5607,18 +5509,13 @@
                     <a:p>
                       <a:pPr algn="ctr"/>
                       <a:r>
-                        <a:rPr lang="en-US" sz="1800" dirty="0" smtClean="0">
+                        <a:rPr lang="en-US" sz="1800" dirty="0">
                           <a:solidFill>
                             <a:schemeClr val="tx1"/>
                           </a:solidFill>
                         </a:rPr>
                         <a:t>Product Owners</a:t>
                       </a:r>
-                      <a:endParaRPr lang="en-US" sz="1800" dirty="0">
-                        <a:solidFill>
-                          <a:schemeClr val="tx1"/>
-                        </a:solidFill>
-                      </a:endParaRPr>
                     </a:p>
                   </a:txBody>
                   <a:tcPr anchor="ctr">
@@ -5687,7 +5584,7 @@
                         <a:defRPr/>
                       </a:pPr>
                       <a:r>
-                        <a:rPr lang="en-US" sz="1800" dirty="0" smtClean="0">
+                        <a:rPr lang="en-US" sz="1800" dirty="0">
                           <a:solidFill>
                             <a:schemeClr val="tx1"/>
                           </a:solidFill>
@@ -5713,7 +5610,7 @@
                         <a:tabLst/>
                         <a:defRPr/>
                       </a:pPr>
-                      <a:endParaRPr lang="en-US" sz="1800" dirty="0" smtClean="0">
+                      <a:endParaRPr lang="en-US" sz="1800" dirty="0">
                         <a:solidFill>
                           <a:schemeClr val="tx1"/>
                         </a:solidFill>
@@ -5778,7 +5675,7 @@
                     <a:p>
                       <a:pPr algn="ctr"/>
                       <a:r>
-                        <a:rPr lang="en-US" sz="1800" dirty="0" err="1" smtClean="0">
+                        <a:rPr lang="en-US" sz="1800" dirty="0" err="1">
                           <a:solidFill>
                             <a:schemeClr val="tx1"/>
                           </a:solidFill>
@@ -5879,6 +5776,11 @@
                   </a:txBody>
                   <a:tcPr anchor="ctr"/>
                 </a:tc>
+                <a:extLst>
+                  <a:ext uri="{0D108BD9-81ED-4DB2-BD59-A6C34878D82A}">
+                    <a16:rowId xmlns:a16="http://schemas.microsoft.com/office/drawing/2014/main" val="10000"/>
+                  </a:ext>
+                </a:extLst>
               </a:tr>
               <a:tr h="1394384">
                 <a:tc vMerge="1">
@@ -5926,7 +5828,7 @@
                         <a:defRPr/>
                       </a:pPr>
                       <a:r>
-                        <a:rPr lang="en-US" sz="1800" b="1" kern="1200" dirty="0" smtClean="0">
+                        <a:rPr lang="en-US" sz="1800" b="1" kern="1200" dirty="0">
                           <a:solidFill>
                             <a:schemeClr val="tx1"/>
                           </a:solidFill>
@@ -6015,7 +5917,7 @@
                         <a:defRPr/>
                       </a:pPr>
                       <a:r>
-                        <a:rPr lang="en-US" sz="1800" b="1" kern="1200" dirty="0" smtClean="0">
+                        <a:rPr lang="en-US" sz="1800" b="1" kern="1200" dirty="0">
                           <a:solidFill>
                             <a:schemeClr val="tx1"/>
                           </a:solidFill>
@@ -6104,7 +6006,7 @@
                         <a:defRPr/>
                       </a:pPr>
                       <a:r>
-                        <a:rPr lang="en-US" sz="1800" b="1" kern="1200" dirty="0" smtClean="0">
+                        <a:rPr lang="en-US" sz="1800" b="1" kern="1200" dirty="0">
                           <a:solidFill>
                             <a:schemeClr val="tx1"/>
                           </a:solidFill>
@@ -6177,7 +6079,7 @@
                     <a:p>
                       <a:pPr marL="0" algn="ctr" defTabSz="1218987" rtl="0" eaLnBrk="1" latinLnBrk="0" hangingPunct="1"/>
                       <a:r>
-                        <a:rPr lang="en-US" sz="1800" b="1" kern="1200" dirty="0" smtClean="0">
+                        <a:rPr lang="en-US" sz="1800" b="1" kern="1200" dirty="0">
                           <a:solidFill>
                             <a:schemeClr val="tx1"/>
                           </a:solidFill>
@@ -6188,7 +6090,7 @@
                         <a:t>NU</a:t>
                       </a:r>
                       <a:r>
-                        <a:rPr lang="en-US" sz="1800" b="1" kern="1200" baseline="0" dirty="0" smtClean="0">
+                        <a:rPr lang="en-US" sz="1800" b="1" kern="1200" baseline="0" dirty="0">
                           <a:solidFill>
                             <a:schemeClr val="tx1"/>
                           </a:solidFill>
@@ -6258,7 +6160,7 @@
                     <a:p>
                       <a:pPr marL="0" algn="ctr" defTabSz="1218987" rtl="0" eaLnBrk="1" latinLnBrk="0" hangingPunct="1"/>
                       <a:r>
-                        <a:rPr lang="en-US" sz="1800" b="1" kern="1200" smtClean="0">
+                        <a:rPr lang="en-US" sz="1800" b="1" kern="1200">
                           <a:solidFill>
                             <a:schemeClr val="tx1"/>
                           </a:solidFill>
@@ -6321,6 +6223,11 @@
                     </a:blipFill>
                   </a:tcPr>
                 </a:tc>
+                <a:extLst>
+                  <a:ext uri="{0D108BD9-81ED-4DB2-BD59-A6C34878D82A}">
+                    <a16:rowId xmlns:a16="http://schemas.microsoft.com/office/drawing/2014/main" val="10001"/>
+                  </a:ext>
+                </a:extLst>
               </a:tr>
               <a:tr h="728677">
                 <a:tc>
@@ -6329,7 +6236,7 @@
                     <a:lstStyle/>
                     <a:p>
                       <a:r>
-                        <a:rPr lang="en-US" sz="1800" dirty="0" err="1" smtClean="0"/>
+                        <a:rPr lang="en-US" sz="1800" dirty="0" err="1"/>
                         <a:t>Vineet</a:t>
                       </a:r>
                       <a:endParaRPr lang="en-US" sz="1800" dirty="0"/>
@@ -6473,6 +6380,11 @@
                     </a:lnT>
                   </a:tcPr>
                 </a:tc>
+                <a:extLst>
+                  <a:ext uri="{0D108BD9-81ED-4DB2-BD59-A6C34878D82A}">
+                    <a16:rowId xmlns:a16="http://schemas.microsoft.com/office/drawing/2014/main" val="10002"/>
+                  </a:ext>
+                </a:extLst>
               </a:tr>
               <a:tr h="728677">
                 <a:tc>
@@ -6481,10 +6393,9 @@
                     <a:lstStyle/>
                     <a:p>
                       <a:r>
-                        <a:rPr lang="en-US" sz="1800" dirty="0" smtClean="0"/>
+                        <a:rPr lang="en-US" sz="1800" dirty="0"/>
                         <a:t>Rugved</a:t>
                       </a:r>
-                      <a:endParaRPr lang="en-US" sz="1800" dirty="0"/>
                     </a:p>
                   </a:txBody>
                   <a:tcPr anchor="ctr"/>
@@ -6555,6 +6466,11 @@
                   </a:txBody>
                   <a:tcPr anchor="ctr"/>
                 </a:tc>
+                <a:extLst>
+                  <a:ext uri="{0D108BD9-81ED-4DB2-BD59-A6C34878D82A}">
+                    <a16:rowId xmlns:a16="http://schemas.microsoft.com/office/drawing/2014/main" val="10003"/>
+                  </a:ext>
+                </a:extLst>
               </a:tr>
             </a:tbl>
           </a:graphicData>
@@ -6762,13 +6678,6 @@
       </p:transition>
     </mc:Fallback>
   </mc:AlternateContent>
-  <p:timing>
-    <p:tnLst>
-      <p:par>
-        <p:cTn id="1" dur="indefinite" restart="never" nodeType="tmRoot"/>
-      </p:par>
-    </p:tnLst>
-  </p:timing>
 </p:sld>
 </file>
 
@@ -6813,10 +6722,9 @@
           <a:p>
             <a:pPr algn="ctr"/>
             <a:r>
-              <a:rPr lang="en-US" sz="4400" dirty="0" smtClean="0"/>
+              <a:rPr lang="en-US" sz="4400" dirty="0"/>
               <a:t>THANK YOU !</a:t>
             </a:r>
-            <a:endParaRPr lang="en-US" sz="4400" dirty="0"/>
           </a:p>
         </p:txBody>
       </p:sp>
@@ -6872,13 +6780,6 @@
       </p:transition>
     </mc:Fallback>
   </mc:AlternateContent>
-  <p:timing>
-    <p:tnLst>
-      <p:par>
-        <p:cTn id="1" dur="indefinite" restart="never" nodeType="tmRoot"/>
-      </p:par>
-    </p:tnLst>
-  </p:timing>
 </p:sld>
 </file>
 

</xml_diff>